<commit_message>
fix week1 slide date
</commit_message>
<xml_diff>
--- a/2020/slides/week1_1.pptx
+++ b/2020/slides/week1_1.pptx
@@ -232,7 +232,7 @@
           <a:p>
             <a:fld id="{8CCE4C83-8F64-4E29-91B9-0017BF1F34A9}" type="datetimeFigureOut">
               <a:rPr lang="en-US" smtClean="0"/>
-              <a:t>3/1/2020</a:t>
+              <a:t>3/2/2020</a:t>
             </a:fld>
             <a:endParaRPr lang="en-US"/>
           </a:p>
@@ -672,7 +672,7 @@
                   <a:srgbClr val="898989"/>
                 </a:solidFill>
               </a:rPr>
-              <a:t>2019</a:t>
+              <a:t>2020</a:t>
             </a:r>
             <a:r>
               <a:rPr lang="zh-TW" altLang="en-US" b="1" i="1" dirty="0">
@@ -688,7 +688,7 @@
                   <a:srgbClr val="898989"/>
                 </a:solidFill>
               </a:rPr>
-              <a:t>2</a:t>
+              <a:t>03</a:t>
             </a:r>
             <a:r>
               <a:rPr lang="zh-TW" altLang="en-US" b="1" i="1" dirty="0">
@@ -704,7 +704,7 @@
                   <a:srgbClr val="898989"/>
                 </a:solidFill>
               </a:rPr>
-              <a:t>20</a:t>
+              <a:t>04</a:t>
             </a:r>
             <a:r>
               <a:rPr lang="zh-TW" altLang="en-US" b="1" i="1" dirty="0">
@@ -903,7 +903,7 @@
           <a:p>
             <a:fld id="{035F119F-FD58-488C-9B81-4BDF4DEB90EC}" type="datetimeFigureOut">
               <a:rPr lang="zh-TW" altLang="en-US" smtClean="0"/>
-              <a:t>2020/3/1</a:t>
+              <a:t>2020/3/2</a:t>
             </a:fld>
             <a:endParaRPr lang="zh-TW" altLang="en-US"/>
           </a:p>
@@ -1119,7 +1119,7 @@
           <a:p>
             <a:fld id="{035F119F-FD58-488C-9B81-4BDF4DEB90EC}" type="datetimeFigureOut">
               <a:rPr lang="zh-TW" altLang="en-US" smtClean="0"/>
-              <a:t>2020/3/1</a:t>
+              <a:t>2020/3/2</a:t>
             </a:fld>
             <a:endParaRPr lang="zh-TW" altLang="en-US"/>
           </a:p>
@@ -1529,7 +1529,7 @@
                   <a:srgbClr val="898989"/>
                 </a:solidFill>
               </a:rPr>
-              <a:t>2019</a:t>
+              <a:t>2020</a:t>
             </a:r>
             <a:r>
               <a:rPr lang="zh-TW" altLang="en-US" b="1" i="1" dirty="0">
@@ -1545,7 +1545,7 @@
                   <a:srgbClr val="898989"/>
                 </a:solidFill>
               </a:rPr>
-              <a:t>2</a:t>
+              <a:t>03</a:t>
             </a:r>
             <a:r>
               <a:rPr lang="zh-TW" altLang="en-US" b="1" i="1" dirty="0">
@@ -1561,7 +1561,7 @@
                   <a:srgbClr val="898989"/>
                 </a:solidFill>
               </a:rPr>
-              <a:t>20</a:t>
+              <a:t>04</a:t>
             </a:r>
             <a:r>
               <a:rPr lang="zh-TW" altLang="en-US" b="1" i="1" dirty="0">
@@ -1980,7 +1980,7 @@
                   <a:srgbClr val="898989"/>
                 </a:solidFill>
               </a:rPr>
-              <a:t>2019</a:t>
+              <a:t>2020</a:t>
             </a:r>
             <a:r>
               <a:rPr lang="zh-TW" altLang="en-US" b="1" i="1" dirty="0">
@@ -1996,7 +1996,7 @@
                   <a:srgbClr val="898989"/>
                 </a:solidFill>
               </a:rPr>
-              <a:t>2</a:t>
+              <a:t>03</a:t>
             </a:r>
             <a:r>
               <a:rPr lang="zh-TW" altLang="en-US" b="1" i="1" dirty="0">
@@ -2012,7 +2012,7 @@
                   <a:srgbClr val="898989"/>
                 </a:solidFill>
               </a:rPr>
-              <a:t>20</a:t>
+              <a:t>04</a:t>
             </a:r>
             <a:r>
               <a:rPr lang="zh-TW" altLang="en-US" b="1" i="1" dirty="0">
@@ -2357,11 +2357,62 @@
           <a:bodyPr/>
           <a:lstStyle/>
           <a:p>
-            <a:fld id="{035F119F-FD58-488C-9B81-4BDF4DEB90EC}" type="datetimeFigureOut">
-              <a:rPr lang="zh-TW" altLang="en-US" smtClean="0"/>
-              <a:t>2020/3/1</a:t>
-            </a:fld>
-            <a:endParaRPr lang="zh-TW" altLang="en-US"/>
+            <a:r>
+              <a:rPr lang="en-US" altLang="zh-TW" b="1" i="1" dirty="0">
+                <a:solidFill>
+                  <a:srgbClr val="898989"/>
+                </a:solidFill>
+              </a:rPr>
+              <a:t>2020</a:t>
+            </a:r>
+            <a:r>
+              <a:rPr lang="zh-TW" altLang="en-US" b="1" i="1" dirty="0">
+                <a:solidFill>
+                  <a:srgbClr val="898989"/>
+                </a:solidFill>
+              </a:rPr>
+              <a:t>年</a:t>
+            </a:r>
+            <a:r>
+              <a:rPr lang="en-US" altLang="zh-TW" b="1" i="1" dirty="0">
+                <a:solidFill>
+                  <a:srgbClr val="898989"/>
+                </a:solidFill>
+              </a:rPr>
+              <a:t>03</a:t>
+            </a:r>
+            <a:r>
+              <a:rPr lang="zh-TW" altLang="en-US" b="1" i="1" dirty="0">
+                <a:solidFill>
+                  <a:srgbClr val="898989"/>
+                </a:solidFill>
+              </a:rPr>
+              <a:t>月</a:t>
+            </a:r>
+            <a:r>
+              <a:rPr lang="en-US" altLang="zh-TW" b="1" i="1" dirty="0">
+                <a:solidFill>
+                  <a:srgbClr val="898989"/>
+                </a:solidFill>
+              </a:rPr>
+              <a:t>04</a:t>
+            </a:r>
+            <a:r>
+              <a:rPr lang="zh-TW" altLang="en-US" b="1" i="1" dirty="0">
+                <a:solidFill>
+                  <a:srgbClr val="898989"/>
+                </a:solidFill>
+              </a:rPr>
+              <a:t>日星期三</a:t>
+            </a:r>
+            <a:endParaRPr lang="en-US" altLang="zh-TW" b="1" i="1" dirty="0">
+              <a:solidFill>
+                <a:srgbClr val="898989"/>
+              </a:solidFill>
+            </a:endParaRPr>
+          </a:p>
+          <a:p>
+            <a:endParaRPr lang="zh-TW" altLang="en-US" dirty="0"/>
           </a:p>
         </p:txBody>
       </p:sp>
@@ -2779,7 +2830,7 @@
           <a:p>
             <a:fld id="{035F119F-FD58-488C-9B81-4BDF4DEB90EC}" type="datetimeFigureOut">
               <a:rPr lang="zh-TW" altLang="en-US" smtClean="0"/>
-              <a:t>2020/3/1</a:t>
+              <a:t>2020/3/2</a:t>
             </a:fld>
             <a:endParaRPr lang="zh-TW" altLang="en-US"/>
           </a:p>
@@ -2928,7 +2979,7 @@
           <a:p>
             <a:fld id="{035F119F-FD58-488C-9B81-4BDF4DEB90EC}" type="datetimeFigureOut">
               <a:rPr lang="zh-TW" altLang="en-US" smtClean="0"/>
-              <a:t>2020/3/1</a:t>
+              <a:t>2020/3/2</a:t>
             </a:fld>
             <a:endParaRPr lang="zh-TW" altLang="en-US"/>
           </a:p>
@@ -3049,7 +3100,7 @@
           <a:p>
             <a:fld id="{035F119F-FD58-488C-9B81-4BDF4DEB90EC}" type="datetimeFigureOut">
               <a:rPr lang="zh-TW" altLang="en-US" smtClean="0"/>
-              <a:t>2020/3/1</a:t>
+              <a:t>2020/3/2</a:t>
             </a:fld>
             <a:endParaRPr lang="zh-TW" altLang="en-US"/>
           </a:p>
@@ -3368,7 +3419,7 @@
           <a:p>
             <a:fld id="{035F119F-FD58-488C-9B81-4BDF4DEB90EC}" type="datetimeFigureOut">
               <a:rPr lang="zh-TW" altLang="en-US" smtClean="0"/>
-              <a:t>2020/3/1</a:t>
+              <a:t>2020/3/2</a:t>
             </a:fld>
             <a:endParaRPr lang="zh-TW" altLang="en-US"/>
           </a:p>
@@ -3664,7 +3715,7 @@
           <a:p>
             <a:fld id="{035F119F-FD58-488C-9B81-4BDF4DEB90EC}" type="datetimeFigureOut">
               <a:rPr lang="zh-TW" altLang="en-US" smtClean="0"/>
-              <a:t>2020/3/1</a:t>
+              <a:t>2020/3/2</a:t>
             </a:fld>
             <a:endParaRPr lang="zh-TW" altLang="en-US"/>
           </a:p>

</xml_diff>